<commit_message>
Update environment configuration, remove organizations data, and refactor location handling in forms
</commit_message>
<xml_diff>
--- a/Защита/Презентация Microsoft PowerPoint.pptx
+++ b/Защита/Презентация Microsoft PowerPoint.pptx
@@ -14,7 +14,8 @@
     <p:sldId id="264" r:id="rId8"/>
     <p:sldId id="263" r:id="rId9"/>
     <p:sldId id="265" r:id="rId10"/>
-    <p:sldId id="266" r:id="rId11"/>
+    <p:sldId id="267" r:id="rId11"/>
+    <p:sldId id="266" r:id="rId12"/>
   </p:sldIdLst>
   <p:sldSz cx="12192000" cy="6858000"/>
   <p:notesSz cx="6858000" cy="9144000"/>
@@ -3546,7 +3547,7 @@
         <p:cNvPr id="1" name="">
           <a:extLst>
             <a:ext uri="{FF2B5EF4-FFF2-40B4-BE49-F238E27FC236}">
-              <a16:creationId xmlns:a16="http://schemas.microsoft.com/office/drawing/2014/main" id="{74F4D9FF-705A-A6AC-4632-B4FDB0ACC184}"/>
+              <a16:creationId xmlns:a16="http://schemas.microsoft.com/office/drawing/2014/main" id="{D22630F2-EEE2-4D59-6A56-4B1E58298209}"/>
             </a:ext>
           </a:extLst>
         </p:cNvPr>
@@ -3566,7 +3567,7 @@
           <p:cNvPr id="2" name="Заголовок 1">
             <a:extLst>
               <a:ext uri="{FF2B5EF4-FFF2-40B4-BE49-F238E27FC236}">
-                <a16:creationId xmlns:a16="http://schemas.microsoft.com/office/drawing/2014/main" id="{26587ADD-BA81-0649-059E-F3205BEECF7F}"/>
+                <a16:creationId xmlns:a16="http://schemas.microsoft.com/office/drawing/2014/main" id="{C6E3104B-742A-EAF0-F639-B8ABCE1BD70C}"/>
               </a:ext>
             </a:extLst>
           </p:cNvPr>
@@ -3593,7 +3594,7 @@
           <p:cNvPr id="3" name="Подзаголовок 2">
             <a:extLst>
               <a:ext uri="{FF2B5EF4-FFF2-40B4-BE49-F238E27FC236}">
-                <a16:creationId xmlns:a16="http://schemas.microsoft.com/office/drawing/2014/main" id="{EF61B024-1F27-C3FD-2568-56E57BED5B7F}"/>
+                <a16:creationId xmlns:a16="http://schemas.microsoft.com/office/drawing/2014/main" id="{DB55BD07-7EAD-209D-845D-9EC3FC113FF0}"/>
               </a:ext>
             </a:extLst>
           </p:cNvPr>
@@ -3620,7 +3621,7 @@
           <p:cNvPr id="5" name="Рисунок 4">
             <a:extLst>
               <a:ext uri="{FF2B5EF4-FFF2-40B4-BE49-F238E27FC236}">
-                <a16:creationId xmlns:a16="http://schemas.microsoft.com/office/drawing/2014/main" id="{3680D1A2-545A-F3D4-9590-5132B86AC7A6}"/>
+                <a16:creationId xmlns:a16="http://schemas.microsoft.com/office/drawing/2014/main" id="{EC2F3F15-E112-490B-24B7-2BEE4E3C0392}"/>
               </a:ext>
             </a:extLst>
           </p:cNvPr>
@@ -3647,169 +3648,10 @@
       </p:pic>
       <p:sp>
         <p:nvSpPr>
-          <p:cNvPr id="6" name="TextBox 5">
-            <a:extLst>
-              <a:ext uri="{FF2B5EF4-FFF2-40B4-BE49-F238E27FC236}">
-                <a16:creationId xmlns:a16="http://schemas.microsoft.com/office/drawing/2014/main" id="{8FBACA06-6876-27DA-EB85-790ED8EA0BAC}"/>
-              </a:ext>
-            </a:extLst>
-          </p:cNvPr>
-          <p:cNvSpPr txBox="1"/>
-          <p:nvPr/>
-        </p:nvSpPr>
-        <p:spPr>
-          <a:xfrm>
-            <a:off x="207832" y="2351782"/>
-            <a:ext cx="11572876" cy="1077218"/>
-          </a:xfrm>
-          <a:prstGeom prst="rect">
-            <a:avLst/>
-          </a:prstGeom>
-          <a:noFill/>
-        </p:spPr>
-        <p:txBody>
-          <a:bodyPr wrap="square" rtlCol="0">
-            <a:spAutoFit/>
-          </a:bodyPr>
-          <a:lstStyle/>
-          <a:p>
-            <a:pPr algn="ctr"/>
-            <a:r>
-              <a:rPr lang="en-US" sz="3200" dirty="0" err="1">
-                <a:solidFill>
-                  <a:schemeClr val="bg1"/>
-                </a:solidFill>
-                <a:latin typeface="Arial Black" panose="020B0A04020102020204" pitchFamily="34" charset="0"/>
-              </a:rPr>
-              <a:t>Github</a:t>
-            </a:r>
-            <a:r>
-              <a:rPr lang="en-US" sz="3200" dirty="0">
-                <a:solidFill>
-                  <a:schemeClr val="bg1"/>
-                </a:solidFill>
-                <a:latin typeface="Arial Black" panose="020B0A04020102020204" pitchFamily="34" charset="0"/>
-              </a:rPr>
-              <a:t>: </a:t>
-            </a:r>
-            <a:r>
-              <a:rPr lang="en-US" sz="3200" dirty="0">
-                <a:solidFill>
-                  <a:schemeClr val="accent5">
-                    <a:lumMod val="60000"/>
-                    <a:lumOff val="40000"/>
-                  </a:schemeClr>
-                </a:solidFill>
-                <a:latin typeface="Arial Black" panose="020B0A04020102020204" pitchFamily="34" charset="0"/>
-                <a:hlinkClick r:id="rId3" tooltip="https://github.com/Web2Bizz/atom-dbro-gateway.git">
-                  <a:extLst>
-                    <a:ext uri="{A12FA001-AC4F-418D-AE19-62706E023703}">
-                      <ahyp:hlinkClr xmlns:ahyp="http://schemas.microsoft.com/office/drawing/2018/hyperlinkcolor" val="tx"/>
-                    </a:ext>
-                  </a:extLst>
-                </a:hlinkClick>
-              </a:rPr>
-              <a:t>https://github.com/Web2Bizz/atom-dbro-gateway.git</a:t>
-            </a:r>
-            <a:endParaRPr lang="ru-RU" sz="3200" dirty="0">
-              <a:solidFill>
-                <a:schemeClr val="accent5">
-                  <a:lumMod val="60000"/>
-                  <a:lumOff val="40000"/>
-                </a:schemeClr>
-              </a:solidFill>
-              <a:latin typeface="Arial Black" panose="020B0A04020102020204" pitchFamily="34" charset="0"/>
-            </a:endParaRPr>
-          </a:p>
-        </p:txBody>
-      </p:sp>
-      <p:sp>
-        <p:nvSpPr>
-          <p:cNvPr id="4" name="TextBox 3">
-            <a:extLst>
-              <a:ext uri="{FF2B5EF4-FFF2-40B4-BE49-F238E27FC236}">
-                <a16:creationId xmlns:a16="http://schemas.microsoft.com/office/drawing/2014/main" id="{EC1EB94F-4B17-2934-796C-B98F92A055A0}"/>
-              </a:ext>
-            </a:extLst>
-          </p:cNvPr>
-          <p:cNvSpPr txBox="1"/>
-          <p:nvPr/>
-        </p:nvSpPr>
-        <p:spPr>
-          <a:xfrm>
-            <a:off x="-1287268" y="3364050"/>
-            <a:ext cx="11870935" cy="584775"/>
-          </a:xfrm>
-          <a:prstGeom prst="rect">
-            <a:avLst/>
-          </a:prstGeom>
-          <a:noFill/>
-        </p:spPr>
-        <p:txBody>
-          <a:bodyPr wrap="square" rtlCol="0">
-            <a:spAutoFit/>
-          </a:bodyPr>
-          <a:lstStyle/>
-          <a:p>
-            <a:pPr algn="ctr"/>
-            <a:r>
-              <a:rPr lang="en-US" sz="3200" dirty="0">
-                <a:solidFill>
-                  <a:schemeClr val="bg1"/>
-                </a:solidFill>
-                <a:latin typeface="Arial Black" panose="020B0A04020102020204" pitchFamily="34" charset="0"/>
-              </a:rPr>
-              <a:t>Website: </a:t>
-            </a:r>
-            <a:r>
-              <a:rPr lang="en-US" sz="3200" dirty="0">
-                <a:solidFill>
-                  <a:schemeClr val="accent5">
-                    <a:lumMod val="60000"/>
-                    <a:lumOff val="40000"/>
-                  </a:schemeClr>
-                </a:solidFill>
-                <a:latin typeface="Arial Black" panose="020B0A04020102020204" pitchFamily="34" charset="0"/>
-                <a:hlinkClick r:id="rId4" tooltip="http://82.202.140.37:3000/">
-                  <a:extLst>
-                    <a:ext uri="{A12FA001-AC4F-418D-AE19-62706E023703}">
-                      <ahyp:hlinkClr xmlns:ahyp="http://schemas.microsoft.com/office/drawing/2018/hyperlinkcolor" val="tx"/>
-                    </a:ext>
-                  </a:extLst>
-                </a:hlinkClick>
-              </a:rPr>
-              <a:t>http://82.202.140.37:3000/</a:t>
-            </a:r>
-            <a:r>
-              <a:rPr lang="en-US" sz="3200" dirty="0">
-                <a:solidFill>
-                  <a:schemeClr val="accent5">
-                    <a:lumMod val="60000"/>
-                    <a:lumOff val="40000"/>
-                  </a:schemeClr>
-                </a:solidFill>
-                <a:latin typeface="Arial Black" panose="020B0A04020102020204" pitchFamily="34" charset="0"/>
-              </a:rPr>
-              <a:t> </a:t>
-            </a:r>
-            <a:endParaRPr lang="ru-RU" sz="3200" dirty="0">
-              <a:solidFill>
-                <a:schemeClr val="accent5">
-                  <a:lumMod val="60000"/>
-                  <a:lumOff val="40000"/>
-                </a:schemeClr>
-              </a:solidFill>
-              <a:latin typeface="Arial Black" panose="020B0A04020102020204" pitchFamily="34" charset="0"/>
-            </a:endParaRPr>
-          </a:p>
-        </p:txBody>
-      </p:sp>
-      <p:sp>
-        <p:nvSpPr>
           <p:cNvPr id="9" name="TextBox 8">
             <a:extLst>
               <a:ext uri="{FF2B5EF4-FFF2-40B4-BE49-F238E27FC236}">
-                <a16:creationId xmlns:a16="http://schemas.microsoft.com/office/drawing/2014/main" id="{1AAABB43-E8A1-8A43-CE1E-807299CBAE07}"/>
+                <a16:creationId xmlns:a16="http://schemas.microsoft.com/office/drawing/2014/main" id="{FCCDF344-E4E7-0070-CC31-1E3D308B76E6}"/>
               </a:ext>
             </a:extLst>
           </p:cNvPr>
@@ -3856,12 +3698,48 @@
           </a:p>
         </p:txBody>
       </p:sp>
-      <p:sp>
-        <p:nvSpPr>
-          <p:cNvPr id="7" name="TextBox 6">
-            <a:extLst>
-              <a:ext uri="{FF2B5EF4-FFF2-40B4-BE49-F238E27FC236}">
-                <a16:creationId xmlns:a16="http://schemas.microsoft.com/office/drawing/2014/main" id="{AC227E77-FD1A-8819-A57C-AF091F441C92}"/>
+      <p:pic>
+        <p:nvPicPr>
+          <p:cNvPr id="10" name="Рисунок 9">
+            <a:extLst>
+              <a:ext uri="{FF2B5EF4-FFF2-40B4-BE49-F238E27FC236}">
+                <a16:creationId xmlns:a16="http://schemas.microsoft.com/office/drawing/2014/main" id="{215A43C4-96FE-03C5-80B7-4DF2DE19DB6B}"/>
+              </a:ext>
+            </a:extLst>
+          </p:cNvPr>
+          <p:cNvPicPr>
+            <a:picLocks noChangeAspect="1"/>
+          </p:cNvPicPr>
+          <p:nvPr/>
+        </p:nvPicPr>
+        <p:blipFill>
+          <a:blip r:embed="rId3">
+            <a:extLst>
+              <a:ext uri="{28A0092B-C50C-407E-A947-70E740481C1C}">
+                <a14:useLocalDpi xmlns:a14="http://schemas.microsoft.com/office/drawing/2010/main" val="0"/>
+              </a:ext>
+            </a:extLst>
+          </a:blip>
+          <a:stretch>
+            <a:fillRect/>
+          </a:stretch>
+        </p:blipFill>
+        <p:spPr>
+          <a:xfrm>
+            <a:off x="3132988" y="1122363"/>
+            <a:ext cx="5010888" cy="5010886"/>
+          </a:xfrm>
+          <a:prstGeom prst="rect">
+            <a:avLst/>
+          </a:prstGeom>
+        </p:spPr>
+      </p:pic>
+      <p:sp>
+        <p:nvSpPr>
+          <p:cNvPr id="11" name="TextBox 10">
+            <a:extLst>
+              <a:ext uri="{FF2B5EF4-FFF2-40B4-BE49-F238E27FC236}">
+                <a16:creationId xmlns:a16="http://schemas.microsoft.com/office/drawing/2014/main" id="{8A6FBF62-A11C-677D-3319-46BFAAC51976}"/>
               </a:ext>
             </a:extLst>
           </p:cNvPr>
@@ -3870,7 +3748,378 @@
         </p:nvSpPr>
         <p:spPr>
           <a:xfrm>
-            <a:off x="223026" y="4295612"/>
+            <a:off x="833437" y="592138"/>
+            <a:ext cx="10171372" cy="646331"/>
+          </a:xfrm>
+          <a:prstGeom prst="rect">
+            <a:avLst/>
+          </a:prstGeom>
+          <a:noFill/>
+        </p:spPr>
+        <p:txBody>
+          <a:bodyPr wrap="square" rtlCol="0">
+            <a:spAutoFit/>
+          </a:bodyPr>
+          <a:lstStyle/>
+          <a:p>
+            <a:r>
+              <a:rPr lang="ru-RU" sz="3600" dirty="0">
+                <a:solidFill>
+                  <a:schemeClr val="bg1"/>
+                </a:solidFill>
+                <a:latin typeface="Arial Black" panose="020B0A04020102020204" pitchFamily="34" charset="0"/>
+              </a:rPr>
+              <a:t>ЗАЙТИ С МОБИЛЬНОГО УСТРОЙСТВА</a:t>
+            </a:r>
+          </a:p>
+        </p:txBody>
+      </p:sp>
+    </p:spTree>
+    <p:extLst>
+      <p:ext uri="{BB962C8B-B14F-4D97-AF65-F5344CB8AC3E}">
+        <p14:creationId xmlns:p14="http://schemas.microsoft.com/office/powerpoint/2010/main" val="1346139554"/>
+      </p:ext>
+    </p:extLst>
+  </p:cSld>
+  <p:clrMapOvr>
+    <a:masterClrMapping/>
+  </p:clrMapOvr>
+</p:sld>
+</file>
+
+<file path=ppt/slides/slide11.xml><?xml version="1.0" encoding="utf-8"?>
+<p:sld xmlns:a="http://schemas.openxmlformats.org/drawingml/2006/main" xmlns:r="http://schemas.openxmlformats.org/officeDocument/2006/relationships" xmlns:p="http://schemas.openxmlformats.org/presentationml/2006/main">
+  <p:cSld>
+    <p:spTree>
+      <p:nvGrpSpPr>
+        <p:cNvPr id="1" name="">
+          <a:extLst>
+            <a:ext uri="{FF2B5EF4-FFF2-40B4-BE49-F238E27FC236}">
+              <a16:creationId xmlns:a16="http://schemas.microsoft.com/office/drawing/2014/main" id="{74F4D9FF-705A-A6AC-4632-B4FDB0ACC184}"/>
+            </a:ext>
+          </a:extLst>
+        </p:cNvPr>
+        <p:cNvGrpSpPr/>
+        <p:nvPr/>
+      </p:nvGrpSpPr>
+      <p:grpSpPr>
+        <a:xfrm>
+          <a:off x="0" y="0"/>
+          <a:ext cx="0" cy="0"/>
+          <a:chOff x="0" y="0"/>
+          <a:chExt cx="0" cy="0"/>
+        </a:xfrm>
+      </p:grpSpPr>
+      <p:sp>
+        <p:nvSpPr>
+          <p:cNvPr id="2" name="Заголовок 1">
+            <a:extLst>
+              <a:ext uri="{FF2B5EF4-FFF2-40B4-BE49-F238E27FC236}">
+                <a16:creationId xmlns:a16="http://schemas.microsoft.com/office/drawing/2014/main" id="{26587ADD-BA81-0649-059E-F3205BEECF7F}"/>
+              </a:ext>
+            </a:extLst>
+          </p:cNvPr>
+          <p:cNvSpPr>
+            <a:spLocks noGrp="1"/>
+          </p:cNvSpPr>
+          <p:nvPr>
+            <p:ph type="ctrTitle"/>
+          </p:nvPr>
+        </p:nvSpPr>
+        <p:spPr/>
+        <p:txBody>
+          <a:bodyPr>
+            <a:normAutofit/>
+          </a:bodyPr>
+          <a:lstStyle/>
+          <a:p>
+            <a:endParaRPr lang="ru-RU" sz="4000"/>
+          </a:p>
+        </p:txBody>
+      </p:sp>
+      <p:sp>
+        <p:nvSpPr>
+          <p:cNvPr id="3" name="Подзаголовок 2">
+            <a:extLst>
+              <a:ext uri="{FF2B5EF4-FFF2-40B4-BE49-F238E27FC236}">
+                <a16:creationId xmlns:a16="http://schemas.microsoft.com/office/drawing/2014/main" id="{EF61B024-1F27-C3FD-2568-56E57BED5B7F}"/>
+              </a:ext>
+            </a:extLst>
+          </p:cNvPr>
+          <p:cNvSpPr>
+            <a:spLocks noGrp="1"/>
+          </p:cNvSpPr>
+          <p:nvPr>
+            <p:ph type="subTitle" idx="1"/>
+          </p:nvPr>
+        </p:nvSpPr>
+        <p:spPr/>
+        <p:txBody>
+          <a:bodyPr>
+            <a:normAutofit/>
+          </a:bodyPr>
+          <a:lstStyle/>
+          <a:p>
+            <a:endParaRPr lang="ru-RU" sz="4000"/>
+          </a:p>
+        </p:txBody>
+      </p:sp>
+      <p:pic>
+        <p:nvPicPr>
+          <p:cNvPr id="5" name="Рисунок 4">
+            <a:extLst>
+              <a:ext uri="{FF2B5EF4-FFF2-40B4-BE49-F238E27FC236}">
+                <a16:creationId xmlns:a16="http://schemas.microsoft.com/office/drawing/2014/main" id="{3680D1A2-545A-F3D4-9590-5132B86AC7A6}"/>
+              </a:ext>
+            </a:extLst>
+          </p:cNvPr>
+          <p:cNvPicPr>
+            <a:picLocks noChangeAspect="1"/>
+          </p:cNvPicPr>
+          <p:nvPr/>
+        </p:nvPicPr>
+        <p:blipFill>
+          <a:blip r:embed="rId2"/>
+          <a:stretch>
+            <a:fillRect/>
+          </a:stretch>
+        </p:blipFill>
+        <p:spPr>
+          <a:xfrm>
+            <a:off x="-203459" y="-24538"/>
+            <a:ext cx="12395459" cy="6882538"/>
+          </a:xfrm>
+          <a:prstGeom prst="rect">
+            <a:avLst/>
+          </a:prstGeom>
+        </p:spPr>
+      </p:pic>
+      <p:sp>
+        <p:nvSpPr>
+          <p:cNvPr id="6" name="TextBox 5">
+            <a:extLst>
+              <a:ext uri="{FF2B5EF4-FFF2-40B4-BE49-F238E27FC236}">
+                <a16:creationId xmlns:a16="http://schemas.microsoft.com/office/drawing/2014/main" id="{8FBACA06-6876-27DA-EB85-790ED8EA0BAC}"/>
+              </a:ext>
+            </a:extLst>
+          </p:cNvPr>
+          <p:cNvSpPr txBox="1"/>
+          <p:nvPr/>
+        </p:nvSpPr>
+        <p:spPr>
+          <a:xfrm>
+            <a:off x="141157" y="2416732"/>
+            <a:ext cx="11572876" cy="1077218"/>
+          </a:xfrm>
+          <a:prstGeom prst="rect">
+            <a:avLst/>
+          </a:prstGeom>
+          <a:noFill/>
+        </p:spPr>
+        <p:txBody>
+          <a:bodyPr wrap="square" rtlCol="0">
+            <a:spAutoFit/>
+          </a:bodyPr>
+          <a:lstStyle/>
+          <a:p>
+            <a:pPr algn="ctr"/>
+            <a:r>
+              <a:rPr lang="en-US" sz="3200" dirty="0" err="1">
+                <a:solidFill>
+                  <a:schemeClr val="bg1"/>
+                </a:solidFill>
+                <a:latin typeface="Arial Black" panose="020B0A04020102020204" pitchFamily="34" charset="0"/>
+              </a:rPr>
+              <a:t>Github</a:t>
+            </a:r>
+            <a:r>
+              <a:rPr lang="en-US" sz="3200" dirty="0">
+                <a:solidFill>
+                  <a:schemeClr val="bg1"/>
+                </a:solidFill>
+                <a:latin typeface="Arial Black" panose="020B0A04020102020204" pitchFamily="34" charset="0"/>
+              </a:rPr>
+              <a:t>: </a:t>
+            </a:r>
+            <a:r>
+              <a:rPr lang="en-US" sz="3200" dirty="0">
+                <a:solidFill>
+                  <a:schemeClr val="accent5">
+                    <a:lumMod val="60000"/>
+                    <a:lumOff val="40000"/>
+                  </a:schemeClr>
+                </a:solidFill>
+                <a:latin typeface="Arial Black" panose="020B0A04020102020204" pitchFamily="34" charset="0"/>
+                <a:hlinkClick r:id="rId3" tooltip="https://github.com/Web2Bizz/atom-dbro-gateway.git">
+                  <a:extLst>
+                    <a:ext uri="{A12FA001-AC4F-418D-AE19-62706E023703}">
+                      <ahyp:hlinkClr xmlns:ahyp="http://schemas.microsoft.com/office/drawing/2018/hyperlinkcolor" val="tx"/>
+                    </a:ext>
+                  </a:extLst>
+                </a:hlinkClick>
+              </a:rPr>
+              <a:t>https://github.com/Web2Bizz/atom-dbro-gateway.git</a:t>
+            </a:r>
+            <a:endParaRPr lang="ru-RU" sz="3200" dirty="0">
+              <a:solidFill>
+                <a:schemeClr val="accent5">
+                  <a:lumMod val="60000"/>
+                  <a:lumOff val="40000"/>
+                </a:schemeClr>
+              </a:solidFill>
+              <a:latin typeface="Arial Black" panose="020B0A04020102020204" pitchFamily="34" charset="0"/>
+            </a:endParaRPr>
+          </a:p>
+        </p:txBody>
+      </p:sp>
+      <p:sp>
+        <p:nvSpPr>
+          <p:cNvPr id="4" name="TextBox 3">
+            <a:extLst>
+              <a:ext uri="{FF2B5EF4-FFF2-40B4-BE49-F238E27FC236}">
+                <a16:creationId xmlns:a16="http://schemas.microsoft.com/office/drawing/2014/main" id="{EC1EB94F-4B17-2934-796C-B98F92A055A0}"/>
+              </a:ext>
+            </a:extLst>
+          </p:cNvPr>
+          <p:cNvSpPr txBox="1"/>
+          <p:nvPr/>
+        </p:nvSpPr>
+        <p:spPr>
+          <a:xfrm>
+            <a:off x="-1353943" y="3429000"/>
+            <a:ext cx="11870935" cy="584775"/>
+          </a:xfrm>
+          <a:prstGeom prst="rect">
+            <a:avLst/>
+          </a:prstGeom>
+          <a:noFill/>
+        </p:spPr>
+        <p:txBody>
+          <a:bodyPr wrap="square" rtlCol="0">
+            <a:spAutoFit/>
+          </a:bodyPr>
+          <a:lstStyle/>
+          <a:p>
+            <a:pPr algn="ctr"/>
+            <a:r>
+              <a:rPr lang="en-US" sz="3200" dirty="0">
+                <a:solidFill>
+                  <a:schemeClr val="bg1"/>
+                </a:solidFill>
+                <a:latin typeface="Arial Black" panose="020B0A04020102020204" pitchFamily="34" charset="0"/>
+              </a:rPr>
+              <a:t>Website: </a:t>
+            </a:r>
+            <a:r>
+              <a:rPr lang="en-US" sz="3200" dirty="0">
+                <a:solidFill>
+                  <a:schemeClr val="accent5">
+                    <a:lumMod val="60000"/>
+                    <a:lumOff val="40000"/>
+                  </a:schemeClr>
+                </a:solidFill>
+                <a:latin typeface="Arial Black" panose="020B0A04020102020204" pitchFamily="34" charset="0"/>
+                <a:hlinkClick r:id="rId4" tooltip="http://82.202.140.37:3000/">
+                  <a:extLst>
+                    <a:ext uri="{A12FA001-AC4F-418D-AE19-62706E023703}">
+                      <ahyp:hlinkClr xmlns:ahyp="http://schemas.microsoft.com/office/drawing/2018/hyperlinkcolor" val="tx"/>
+                    </a:ext>
+                  </a:extLst>
+                </a:hlinkClick>
+              </a:rPr>
+              <a:t>http://82.202.140.37:3000/</a:t>
+            </a:r>
+            <a:r>
+              <a:rPr lang="en-US" sz="3200" dirty="0">
+                <a:solidFill>
+                  <a:schemeClr val="accent5">
+                    <a:lumMod val="60000"/>
+                    <a:lumOff val="40000"/>
+                  </a:schemeClr>
+                </a:solidFill>
+                <a:latin typeface="Arial Black" panose="020B0A04020102020204" pitchFamily="34" charset="0"/>
+              </a:rPr>
+              <a:t> </a:t>
+            </a:r>
+            <a:endParaRPr lang="ru-RU" sz="3200" dirty="0">
+              <a:solidFill>
+                <a:schemeClr val="accent5">
+                  <a:lumMod val="60000"/>
+                  <a:lumOff val="40000"/>
+                </a:schemeClr>
+              </a:solidFill>
+              <a:latin typeface="Arial Black" panose="020B0A04020102020204" pitchFamily="34" charset="0"/>
+            </a:endParaRPr>
+          </a:p>
+        </p:txBody>
+      </p:sp>
+      <p:sp>
+        <p:nvSpPr>
+          <p:cNvPr id="9" name="TextBox 8">
+            <a:extLst>
+              <a:ext uri="{FF2B5EF4-FFF2-40B4-BE49-F238E27FC236}">
+                <a16:creationId xmlns:a16="http://schemas.microsoft.com/office/drawing/2014/main" id="{1AAABB43-E8A1-8A43-CE1E-807299CBAE07}"/>
+              </a:ext>
+            </a:extLst>
+          </p:cNvPr>
+          <p:cNvSpPr txBox="1"/>
+          <p:nvPr/>
+        </p:nvSpPr>
+        <p:spPr>
+          <a:xfrm>
+            <a:off x="10086680" y="6259397"/>
+            <a:ext cx="2007281" cy="523220"/>
+          </a:xfrm>
+          <a:prstGeom prst="rect">
+            <a:avLst/>
+          </a:prstGeom>
+          <a:noFill/>
+        </p:spPr>
+        <p:txBody>
+          <a:bodyPr wrap="none" rtlCol="0">
+            <a:spAutoFit/>
+          </a:bodyPr>
+          <a:lstStyle/>
+          <a:p>
+            <a:r>
+              <a:rPr lang="en-US" sz="2800" dirty="0">
+                <a:solidFill>
+                  <a:schemeClr val="accent5">
+                    <a:lumMod val="60000"/>
+                    <a:lumOff val="40000"/>
+                  </a:schemeClr>
+                </a:solidFill>
+                <a:latin typeface="Arial Black" panose="020B0A04020102020204" pitchFamily="34" charset="0"/>
+              </a:rPr>
+              <a:t>Web2bizz</a:t>
+            </a:r>
+            <a:endParaRPr lang="ru-RU" sz="2800" dirty="0">
+              <a:solidFill>
+                <a:schemeClr val="accent5">
+                  <a:lumMod val="60000"/>
+                  <a:lumOff val="40000"/>
+                </a:schemeClr>
+              </a:solidFill>
+              <a:latin typeface="Arial Black" panose="020B0A04020102020204" pitchFamily="34" charset="0"/>
+            </a:endParaRPr>
+          </a:p>
+        </p:txBody>
+      </p:sp>
+      <p:sp>
+        <p:nvSpPr>
+          <p:cNvPr id="7" name="TextBox 6">
+            <a:extLst>
+              <a:ext uri="{FF2B5EF4-FFF2-40B4-BE49-F238E27FC236}">
+                <a16:creationId xmlns:a16="http://schemas.microsoft.com/office/drawing/2014/main" id="{AC227E77-FD1A-8819-A57C-AF091F441C92}"/>
+              </a:ext>
+            </a:extLst>
+          </p:cNvPr>
+          <p:cNvSpPr txBox="1"/>
+          <p:nvPr/>
+        </p:nvSpPr>
+        <p:spPr>
+          <a:xfrm>
+            <a:off x="156351" y="4360562"/>
             <a:ext cx="11870935" cy="584775"/>
           </a:xfrm>
           <a:prstGeom prst="rect">
@@ -5304,8 +5553,8 @@
         </p:nvSpPr>
         <p:spPr>
           <a:xfrm>
-            <a:off x="1421423" y="1962181"/>
-            <a:ext cx="9509270" cy="4524315"/>
+            <a:off x="1421423" y="1631504"/>
+            <a:ext cx="9509270" cy="6001643"/>
           </a:xfrm>
           <a:prstGeom prst="rect">
             <a:avLst/>
@@ -5614,6 +5863,75 @@
               </a:rPr>
               <a:t>нормализация данных и кеширование.</a:t>
             </a:r>
+            <a:endParaRPr lang="en-US" sz="2400" dirty="0">
+              <a:solidFill>
+                <a:schemeClr val="bg1"/>
+              </a:solidFill>
+              <a:latin typeface="Arial Black" panose="020B0A04020102020204" pitchFamily="34" charset="0"/>
+            </a:endParaRPr>
+          </a:p>
+          <a:p>
+            <a:pPr marL="285750" indent="-285750" fontAlgn="base">
+              <a:buFont typeface="Wingdings" panose="05000000000000000000" pitchFamily="2" charset="2"/>
+              <a:buChar char="§"/>
+            </a:pPr>
+            <a:r>
+              <a:rPr lang="en-US" sz="2400" dirty="0">
+                <a:solidFill>
+                  <a:schemeClr val="bg1"/>
+                </a:solidFill>
+                <a:latin typeface="Arial Black" panose="020B0A04020102020204" pitchFamily="34" charset="0"/>
+              </a:rPr>
+              <a:t>S3 Beget</a:t>
+            </a:r>
+          </a:p>
+          <a:p>
+            <a:pPr marL="285750" indent="-285750" fontAlgn="base">
+              <a:buFont typeface="Wingdings" panose="05000000000000000000" pitchFamily="2" charset="2"/>
+              <a:buChar char="§"/>
+            </a:pPr>
+            <a:r>
+              <a:rPr lang="en-US" sz="2400" dirty="0">
+                <a:solidFill>
+                  <a:schemeClr val="bg1"/>
+                </a:solidFill>
+                <a:latin typeface="Arial Black" panose="020B0A04020102020204" pitchFamily="34" charset="0"/>
+              </a:rPr>
+              <a:t>ava-gen</a:t>
+            </a:r>
+          </a:p>
+          <a:p>
+            <a:pPr marL="285750" indent="-285750" fontAlgn="base">
+              <a:buFont typeface="Wingdings" panose="05000000000000000000" pitchFamily="2" charset="2"/>
+              <a:buChar char="§"/>
+            </a:pPr>
+            <a:r>
+              <a:rPr lang="en-US" sz="2400" dirty="0" err="1">
+                <a:solidFill>
+                  <a:schemeClr val="bg1"/>
+                </a:solidFill>
+                <a:latin typeface="Arial Black" panose="020B0A04020102020204" pitchFamily="34" charset="0"/>
+              </a:rPr>
+              <a:t>portainer</a:t>
+            </a:r>
+            <a:endParaRPr lang="en-US" sz="2400" dirty="0">
+              <a:solidFill>
+                <a:schemeClr val="bg1"/>
+              </a:solidFill>
+              <a:latin typeface="Arial Black" panose="020B0A04020102020204" pitchFamily="34" charset="0"/>
+            </a:endParaRPr>
+          </a:p>
+          <a:p>
+            <a:pPr marL="285750" indent="-285750">
+              <a:buFont typeface="Wingdings" panose="05000000000000000000" pitchFamily="2" charset="2"/>
+              <a:buChar char="§"/>
+            </a:pPr>
+            <a:endParaRPr lang="ru-RU" sz="2400" dirty="0">
+              <a:solidFill>
+                <a:schemeClr val="bg1"/>
+              </a:solidFill>
+              <a:latin typeface="Arial Black" panose="020B0A04020102020204" pitchFamily="34" charset="0"/>
+            </a:endParaRPr>
           </a:p>
           <a:p>
             <a:endParaRPr lang="ru-RU" sz="2400" dirty="0">

</xml_diff>